<commit_message>
added auth grant flow in presentation
</commit_message>
<xml_diff>
--- a/OAuth2.pptx
+++ b/OAuth2.pptx
@@ -5,7 +5,7 @@
     <p:sldMasterId id="2147483648" r:id="rId1"/>
   </p:sldMasterIdLst>
   <p:notesMasterIdLst>
-    <p:notesMasterId r:id="rId7"/>
+    <p:notesMasterId r:id="rId8"/>
   </p:notesMasterIdLst>
   <p:sldIdLst>
     <p:sldId id="256" r:id="rId2"/>
@@ -13,6 +13,7 @@
     <p:sldId id="258" r:id="rId4"/>
     <p:sldId id="260" r:id="rId5"/>
     <p:sldId id="259" r:id="rId6"/>
+    <p:sldId id="261" r:id="rId7"/>
   </p:sldIdLst>
   <p:sldSz cx="12192000" cy="6858000"/>
   <p:notesSz cx="6858000" cy="9144000"/>
@@ -111,6 +112,11 @@
       </a:defRPr>
     </a:lvl9pPr>
   </p:defaultTextStyle>
+  <p:extLst>
+    <p:ext uri="{EFAFB233-063F-42B5-8137-9DF3F51BA10A}">
+      <p15:sldGuideLst xmlns:p15="http://schemas.microsoft.com/office/powerpoint/2012/main"/>
+    </p:ext>
+  </p:extLst>
 </p:presentation>
 </file>
 
@@ -208,7 +214,7 @@
           <a:p>
             <a:fld id="{19624AB0-9DFA-5E4B-B5C7-167FD688B4A3}" type="datetimeFigureOut">
               <a:rPr lang="en-US" smtClean="0"/>
-              <a:t>4/24/18</a:t>
+              <a:t>5/9/18</a:t>
             </a:fld>
             <a:endParaRPr lang="en-US"/>
           </a:p>
@@ -706,7 +712,7 @@
           <a:p>
             <a:fld id="{85590921-1F6B-3646-A62C-ADBC136A98E6}" type="datetimeFigureOut">
               <a:rPr lang="en-US" smtClean="0"/>
-              <a:t>4/24/18</a:t>
+              <a:t>5/9/18</a:t>
             </a:fld>
             <a:endParaRPr lang="en-US"/>
           </a:p>
@@ -904,7 +910,7 @@
           <a:p>
             <a:fld id="{85590921-1F6B-3646-A62C-ADBC136A98E6}" type="datetimeFigureOut">
               <a:rPr lang="en-US" smtClean="0"/>
-              <a:t>4/24/18</a:t>
+              <a:t>5/9/18</a:t>
             </a:fld>
             <a:endParaRPr lang="en-US"/>
           </a:p>
@@ -1112,7 +1118,7 @@
           <a:p>
             <a:fld id="{85590921-1F6B-3646-A62C-ADBC136A98E6}" type="datetimeFigureOut">
               <a:rPr lang="en-US" smtClean="0"/>
-              <a:t>4/24/18</a:t>
+              <a:t>5/9/18</a:t>
             </a:fld>
             <a:endParaRPr lang="en-US"/>
           </a:p>
@@ -1310,7 +1316,7 @@
           <a:p>
             <a:fld id="{85590921-1F6B-3646-A62C-ADBC136A98E6}" type="datetimeFigureOut">
               <a:rPr lang="en-US" smtClean="0"/>
-              <a:t>4/24/18</a:t>
+              <a:t>5/9/18</a:t>
             </a:fld>
             <a:endParaRPr lang="en-US"/>
           </a:p>
@@ -1585,7 +1591,7 @@
           <a:p>
             <a:fld id="{85590921-1F6B-3646-A62C-ADBC136A98E6}" type="datetimeFigureOut">
               <a:rPr lang="en-US" smtClean="0"/>
-              <a:t>4/24/18</a:t>
+              <a:t>5/9/18</a:t>
             </a:fld>
             <a:endParaRPr lang="en-US"/>
           </a:p>
@@ -1850,7 +1856,7 @@
           <a:p>
             <a:fld id="{85590921-1F6B-3646-A62C-ADBC136A98E6}" type="datetimeFigureOut">
               <a:rPr lang="en-US" smtClean="0"/>
-              <a:t>4/24/18</a:t>
+              <a:t>5/9/18</a:t>
             </a:fld>
             <a:endParaRPr lang="en-US"/>
           </a:p>
@@ -2262,7 +2268,7 @@
           <a:p>
             <a:fld id="{85590921-1F6B-3646-A62C-ADBC136A98E6}" type="datetimeFigureOut">
               <a:rPr lang="en-US" smtClean="0"/>
-              <a:t>4/24/18</a:t>
+              <a:t>5/9/18</a:t>
             </a:fld>
             <a:endParaRPr lang="en-US"/>
           </a:p>
@@ -2403,7 +2409,7 @@
           <a:p>
             <a:fld id="{85590921-1F6B-3646-A62C-ADBC136A98E6}" type="datetimeFigureOut">
               <a:rPr lang="en-US" smtClean="0"/>
-              <a:t>4/24/18</a:t>
+              <a:t>5/9/18</a:t>
             </a:fld>
             <a:endParaRPr lang="en-US"/>
           </a:p>
@@ -2516,7 +2522,7 @@
           <a:p>
             <a:fld id="{85590921-1F6B-3646-A62C-ADBC136A98E6}" type="datetimeFigureOut">
               <a:rPr lang="en-US" smtClean="0"/>
-              <a:t>4/24/18</a:t>
+              <a:t>5/9/18</a:t>
             </a:fld>
             <a:endParaRPr lang="en-US"/>
           </a:p>
@@ -2827,7 +2833,7 @@
           <a:p>
             <a:fld id="{85590921-1F6B-3646-A62C-ADBC136A98E6}" type="datetimeFigureOut">
               <a:rPr lang="en-US" smtClean="0"/>
-              <a:t>4/24/18</a:t>
+              <a:t>5/9/18</a:t>
             </a:fld>
             <a:endParaRPr lang="en-US"/>
           </a:p>
@@ -3115,7 +3121,7 @@
           <a:p>
             <a:fld id="{85590921-1F6B-3646-A62C-ADBC136A98E6}" type="datetimeFigureOut">
               <a:rPr lang="en-US" smtClean="0"/>
-              <a:t>4/24/18</a:t>
+              <a:t>5/9/18</a:t>
             </a:fld>
             <a:endParaRPr lang="en-US"/>
           </a:p>
@@ -3356,7 +3362,7 @@
           <a:p>
             <a:fld id="{85590921-1F6B-3646-A62C-ADBC136A98E6}" type="datetimeFigureOut">
               <a:rPr lang="en-US" smtClean="0"/>
-              <a:t>4/24/18</a:t>
+              <a:t>5/9/18</a:t>
             </a:fld>
             <a:endParaRPr lang="en-US"/>
           </a:p>
@@ -4118,7 +4124,7 @@
           <p:nvPr/>
         </p:nvPicPr>
         <p:blipFill>
-          <a:blip r:embed="rId3"/>
+          <a:blip r:embed="rId2"/>
           <a:stretch>
             <a:fillRect/>
           </a:stretch>
@@ -4148,7 +4154,7 @@
           <p:nvPr/>
         </p:nvPicPr>
         <p:blipFill>
-          <a:blip r:embed="rId4"/>
+          <a:blip r:embed="rId3"/>
           <a:stretch>
             <a:fillRect/>
           </a:stretch>
@@ -4178,7 +4184,7 @@
           <p:nvPr/>
         </p:nvPicPr>
         <p:blipFill>
-          <a:blip r:embed="rId5"/>
+          <a:blip r:embed="rId4"/>
           <a:stretch>
             <a:fillRect/>
           </a:stretch>
@@ -4208,7 +4214,7 @@
           <p:nvPr/>
         </p:nvPicPr>
         <p:blipFill>
-          <a:blip r:embed="rId6"/>
+          <a:blip r:embed="rId5"/>
           <a:stretch>
             <a:fillRect/>
           </a:stretch>
@@ -4238,7 +4244,7 @@
           <p:nvPr/>
         </p:nvPicPr>
         <p:blipFill>
-          <a:blip r:embed="rId7"/>
+          <a:blip r:embed="rId6"/>
           <a:stretch>
             <a:fillRect/>
           </a:stretch>
@@ -4268,7 +4274,7 @@
           <p:nvPr/>
         </p:nvPicPr>
         <p:blipFill>
-          <a:blip r:embed="rId8"/>
+          <a:blip r:embed="rId7"/>
           <a:stretch>
             <a:fillRect/>
           </a:stretch>
@@ -4298,7 +4304,7 @@
           <p:nvPr/>
         </p:nvPicPr>
         <p:blipFill>
-          <a:blip r:embed="rId9"/>
+          <a:blip r:embed="rId8"/>
           <a:stretch>
             <a:fillRect/>
           </a:stretch>
@@ -4534,6 +4540,53 @@
           </a:p>
         </p:txBody>
       </p:sp>
+      <p:pic>
+        <p:nvPicPr>
+          <p:cNvPr id="1025" name="Picture 1" descr="page24image3803552">
+            <a:extLst>
+              <a:ext uri="{FF2B5EF4-FFF2-40B4-BE49-F238E27FC236}">
+                <a16:creationId xmlns:a16="http://schemas.microsoft.com/office/drawing/2014/main" id="{E0F294EF-5BF0-9B43-B023-265B0135A7BF}"/>
+              </a:ext>
+            </a:extLst>
+          </p:cNvPr>
+          <p:cNvPicPr>
+            <a:picLocks noChangeAspect="1" noChangeArrowheads="1"/>
+          </p:cNvPicPr>
+          <p:nvPr/>
+        </p:nvPicPr>
+        <p:blipFill>
+          <a:blip r:embed="rId9">
+            <a:extLst>
+              <a:ext uri="{28A0092B-C50C-407E-A947-70E740481C1C}">
+                <a14:useLocalDpi xmlns:a14="http://schemas.microsoft.com/office/drawing/2010/main" val="0"/>
+              </a:ext>
+            </a:extLst>
+          </a:blip>
+          <a:srcRect/>
+          <a:stretch>
+            <a:fillRect/>
+          </a:stretch>
+        </p:blipFill>
+        <p:spPr bwMode="auto">
+          <a:xfrm>
+            <a:off x="0" y="0"/>
+            <a:ext cx="4267200" cy="3581400"/>
+          </a:xfrm>
+          <a:prstGeom prst="rect">
+            <a:avLst/>
+          </a:prstGeom>
+          <a:noFill/>
+          <a:extLst>
+            <a:ext uri="{909E8E84-426E-40DD-AFC4-6F175D3DCCD1}">
+              <a14:hiddenFill xmlns:a14="http://schemas.microsoft.com/office/drawing/2010/main">
+                <a:solidFill>
+                  <a:srgbClr val="FFFFFF"/>
+                </a:solidFill>
+              </a14:hiddenFill>
+            </a:ext>
+          </a:extLst>
+        </p:spPr>
+      </p:pic>
     </p:spTree>
     <p:extLst>
       <p:ext uri="{BB962C8B-B14F-4D97-AF65-F5344CB8AC3E}">
@@ -4642,6 +4695,844 @@
     <p:extLst>
       <p:ext uri="{BB962C8B-B14F-4D97-AF65-F5344CB8AC3E}">
         <p14:creationId xmlns:p14="http://schemas.microsoft.com/office/powerpoint/2010/main" val="741945045"/>
+      </p:ext>
+    </p:extLst>
+  </p:cSld>
+  <p:clrMapOvr>
+    <a:masterClrMapping/>
+  </p:clrMapOvr>
+</p:sld>
+</file>
+
+<file path=ppt/slides/slide6.xml><?xml version="1.0" encoding="utf-8"?>
+<p:sld xmlns:a="http://schemas.openxmlformats.org/drawingml/2006/main" xmlns:r="http://schemas.openxmlformats.org/officeDocument/2006/relationships" xmlns:p="http://schemas.openxmlformats.org/presentationml/2006/main">
+  <p:cSld>
+    <p:spTree>
+      <p:nvGrpSpPr>
+        <p:cNvPr id="1" name=""/>
+        <p:cNvGrpSpPr/>
+        <p:nvPr/>
+      </p:nvGrpSpPr>
+      <p:grpSpPr>
+        <a:xfrm>
+          <a:off x="0" y="0"/>
+          <a:ext cx="0" cy="0"/>
+          <a:chOff x="0" y="0"/>
+          <a:chExt cx="0" cy="0"/>
+        </a:xfrm>
+      </p:grpSpPr>
+      <p:sp>
+        <p:nvSpPr>
+          <p:cNvPr id="2" name="Rectangle 1">
+            <a:extLst>
+              <a:ext uri="{FF2B5EF4-FFF2-40B4-BE49-F238E27FC236}">
+                <a16:creationId xmlns:a16="http://schemas.microsoft.com/office/drawing/2014/main" id="{E7C89091-B779-E744-ABA7-BBF0092AC38E}"/>
+              </a:ext>
+            </a:extLst>
+          </p:cNvPr>
+          <p:cNvSpPr/>
+          <p:nvPr/>
+        </p:nvSpPr>
+        <p:spPr>
+          <a:xfrm>
+            <a:off x="807522" y="890649"/>
+            <a:ext cx="1638795" cy="5352798"/>
+          </a:xfrm>
+          <a:prstGeom prst="rect">
+            <a:avLst/>
+          </a:prstGeom>
+          <a:solidFill>
+            <a:schemeClr val="accent1"/>
+          </a:solidFill>
+        </p:spPr>
+        <p:style>
+          <a:lnRef idx="2">
+            <a:schemeClr val="accent1">
+              <a:shade val="50000"/>
+            </a:schemeClr>
+          </a:lnRef>
+          <a:fillRef idx="1">
+            <a:schemeClr val="accent1"/>
+          </a:fillRef>
+          <a:effectRef idx="0">
+            <a:schemeClr val="accent1"/>
+          </a:effectRef>
+          <a:fontRef idx="minor">
+            <a:schemeClr val="lt1"/>
+          </a:fontRef>
+        </p:style>
+        <p:txBody>
+          <a:bodyPr rtlCol="0" anchor="ctr"/>
+          <a:lstStyle/>
+          <a:p>
+            <a:pPr algn="ctr"/>
+            <a:r>
+              <a:rPr lang="en-US" dirty="0"/>
+              <a:t>Client App</a:t>
+            </a:r>
+          </a:p>
+        </p:txBody>
+      </p:sp>
+      <p:sp>
+        <p:nvSpPr>
+          <p:cNvPr id="3" name="Rectangle 2">
+            <a:extLst>
+              <a:ext uri="{FF2B5EF4-FFF2-40B4-BE49-F238E27FC236}">
+                <a16:creationId xmlns:a16="http://schemas.microsoft.com/office/drawing/2014/main" id="{3493CA53-5F56-624D-B403-8CF3B3708AEE}"/>
+              </a:ext>
+            </a:extLst>
+          </p:cNvPr>
+          <p:cNvSpPr/>
+          <p:nvPr/>
+        </p:nvSpPr>
+        <p:spPr>
+          <a:xfrm>
+            <a:off x="7291449" y="890649"/>
+            <a:ext cx="2078182" cy="1175657"/>
+          </a:xfrm>
+          <a:prstGeom prst="rect">
+            <a:avLst/>
+          </a:prstGeom>
+          <a:solidFill>
+            <a:schemeClr val="accent6"/>
+          </a:solidFill>
+        </p:spPr>
+        <p:style>
+          <a:lnRef idx="2">
+            <a:schemeClr val="accent1">
+              <a:shade val="50000"/>
+            </a:schemeClr>
+          </a:lnRef>
+          <a:fillRef idx="1">
+            <a:schemeClr val="accent1"/>
+          </a:fillRef>
+          <a:effectRef idx="0">
+            <a:schemeClr val="accent1"/>
+          </a:effectRef>
+          <a:fontRef idx="minor">
+            <a:schemeClr val="lt1"/>
+          </a:fontRef>
+        </p:style>
+        <p:txBody>
+          <a:bodyPr rtlCol="0" anchor="ctr"/>
+          <a:lstStyle/>
+          <a:p>
+            <a:pPr algn="ctr"/>
+            <a:r>
+              <a:rPr lang="en-US" dirty="0"/>
+              <a:t>Resource Owner</a:t>
+            </a:r>
+          </a:p>
+        </p:txBody>
+      </p:sp>
+      <p:sp>
+        <p:nvSpPr>
+          <p:cNvPr id="6" name="Rectangle 5">
+            <a:extLst>
+              <a:ext uri="{FF2B5EF4-FFF2-40B4-BE49-F238E27FC236}">
+                <a16:creationId xmlns:a16="http://schemas.microsoft.com/office/drawing/2014/main" id="{E4292D7A-315B-8D45-8406-327EC917BB6E}"/>
+              </a:ext>
+            </a:extLst>
+          </p:cNvPr>
+          <p:cNvSpPr/>
+          <p:nvPr/>
+        </p:nvSpPr>
+        <p:spPr>
+          <a:xfrm>
+            <a:off x="7289474" y="2770417"/>
+            <a:ext cx="2078182" cy="1175657"/>
+          </a:xfrm>
+          <a:prstGeom prst="rect">
+            <a:avLst/>
+          </a:prstGeom>
+          <a:solidFill>
+            <a:schemeClr val="accent2"/>
+          </a:solidFill>
+        </p:spPr>
+        <p:style>
+          <a:lnRef idx="2">
+            <a:schemeClr val="accent1">
+              <a:shade val="50000"/>
+            </a:schemeClr>
+          </a:lnRef>
+          <a:fillRef idx="1">
+            <a:schemeClr val="accent1"/>
+          </a:fillRef>
+          <a:effectRef idx="0">
+            <a:schemeClr val="accent1"/>
+          </a:effectRef>
+          <a:fontRef idx="minor">
+            <a:schemeClr val="lt1"/>
+          </a:fontRef>
+        </p:style>
+        <p:txBody>
+          <a:bodyPr rtlCol="0" anchor="ctr"/>
+          <a:lstStyle/>
+          <a:p>
+            <a:pPr algn="ctr"/>
+            <a:r>
+              <a:rPr lang="en-US" dirty="0"/>
+              <a:t>Authorization Server</a:t>
+            </a:r>
+          </a:p>
+        </p:txBody>
+      </p:sp>
+      <p:sp>
+        <p:nvSpPr>
+          <p:cNvPr id="7" name="Rectangle 6">
+            <a:extLst>
+              <a:ext uri="{FF2B5EF4-FFF2-40B4-BE49-F238E27FC236}">
+                <a16:creationId xmlns:a16="http://schemas.microsoft.com/office/drawing/2014/main" id="{C7E5BF38-9907-5545-84FF-B99F4130E1EB}"/>
+              </a:ext>
+            </a:extLst>
+          </p:cNvPr>
+          <p:cNvSpPr/>
+          <p:nvPr/>
+        </p:nvSpPr>
+        <p:spPr>
+          <a:xfrm>
+            <a:off x="7289474" y="4778822"/>
+            <a:ext cx="2078182" cy="1175657"/>
+          </a:xfrm>
+          <a:prstGeom prst="rect">
+            <a:avLst/>
+          </a:prstGeom>
+          <a:solidFill>
+            <a:schemeClr val="accent2"/>
+          </a:solidFill>
+        </p:spPr>
+        <p:style>
+          <a:lnRef idx="2">
+            <a:schemeClr val="accent1">
+              <a:shade val="50000"/>
+            </a:schemeClr>
+          </a:lnRef>
+          <a:fillRef idx="1">
+            <a:schemeClr val="accent1"/>
+          </a:fillRef>
+          <a:effectRef idx="0">
+            <a:schemeClr val="accent1"/>
+          </a:effectRef>
+          <a:fontRef idx="minor">
+            <a:schemeClr val="lt1"/>
+          </a:fontRef>
+        </p:style>
+        <p:txBody>
+          <a:bodyPr rtlCol="0" anchor="ctr"/>
+          <a:lstStyle/>
+          <a:p>
+            <a:pPr algn="ctr"/>
+            <a:r>
+              <a:rPr lang="en-US" dirty="0"/>
+              <a:t>Resource Server</a:t>
+            </a:r>
+          </a:p>
+        </p:txBody>
+      </p:sp>
+      <p:pic>
+        <p:nvPicPr>
+          <p:cNvPr id="4" name="Picture 3">
+            <a:extLst>
+              <a:ext uri="{FF2B5EF4-FFF2-40B4-BE49-F238E27FC236}">
+                <a16:creationId xmlns:a16="http://schemas.microsoft.com/office/drawing/2014/main" id="{051F7348-E718-C94E-8006-612856B976CC}"/>
+              </a:ext>
+            </a:extLst>
+          </p:cNvPr>
+          <p:cNvPicPr>
+            <a:picLocks noChangeAspect="1"/>
+          </p:cNvPicPr>
+          <p:nvPr/>
+        </p:nvPicPr>
+        <p:blipFill>
+          <a:blip r:embed="rId2"/>
+          <a:stretch>
+            <a:fillRect/>
+          </a:stretch>
+        </p:blipFill>
+        <p:spPr>
+          <a:xfrm>
+            <a:off x="9455359" y="1059873"/>
+            <a:ext cx="981005" cy="1050966"/>
+          </a:xfrm>
+          <a:prstGeom prst="rect">
+            <a:avLst/>
+          </a:prstGeom>
+        </p:spPr>
+      </p:pic>
+      <p:sp>
+        <p:nvSpPr>
+          <p:cNvPr id="12" name="Right Arrow 11">
+            <a:extLst>
+              <a:ext uri="{FF2B5EF4-FFF2-40B4-BE49-F238E27FC236}">
+                <a16:creationId xmlns:a16="http://schemas.microsoft.com/office/drawing/2014/main" id="{DC855D4B-60AB-EE42-A716-3E9AA0AD0F33}"/>
+              </a:ext>
+            </a:extLst>
+          </p:cNvPr>
+          <p:cNvSpPr/>
+          <p:nvPr/>
+        </p:nvSpPr>
+        <p:spPr>
+          <a:xfrm>
+            <a:off x="2446317" y="1199408"/>
+            <a:ext cx="4845132" cy="118753"/>
+          </a:xfrm>
+          <a:prstGeom prst="rightArrow">
+            <a:avLst/>
+          </a:prstGeom>
+        </p:spPr>
+        <p:style>
+          <a:lnRef idx="2">
+            <a:schemeClr val="accent5">
+              <a:shade val="50000"/>
+            </a:schemeClr>
+          </a:lnRef>
+          <a:fillRef idx="1">
+            <a:schemeClr val="accent5"/>
+          </a:fillRef>
+          <a:effectRef idx="0">
+            <a:schemeClr val="accent5"/>
+          </a:effectRef>
+          <a:fontRef idx="minor">
+            <a:schemeClr val="lt1"/>
+          </a:fontRef>
+        </p:style>
+        <p:txBody>
+          <a:bodyPr rtlCol="0" anchor="ctr"/>
+          <a:lstStyle/>
+          <a:p>
+            <a:pPr algn="ctr"/>
+            <a:endParaRPr lang="en-US"/>
+          </a:p>
+        </p:txBody>
+      </p:sp>
+      <p:sp>
+        <p:nvSpPr>
+          <p:cNvPr id="13" name="Left Arrow 12">
+            <a:extLst>
+              <a:ext uri="{FF2B5EF4-FFF2-40B4-BE49-F238E27FC236}">
+                <a16:creationId xmlns:a16="http://schemas.microsoft.com/office/drawing/2014/main" id="{E7CA61B4-C877-1741-A138-2E7D8FEC08CC}"/>
+              </a:ext>
+            </a:extLst>
+          </p:cNvPr>
+          <p:cNvSpPr/>
+          <p:nvPr/>
+        </p:nvSpPr>
+        <p:spPr>
+          <a:xfrm>
+            <a:off x="2446317" y="1754578"/>
+            <a:ext cx="4845132" cy="106878"/>
+          </a:xfrm>
+          <a:prstGeom prst="leftArrow">
+            <a:avLst/>
+          </a:prstGeom>
+        </p:spPr>
+        <p:style>
+          <a:lnRef idx="2">
+            <a:schemeClr val="accent5">
+              <a:shade val="50000"/>
+            </a:schemeClr>
+          </a:lnRef>
+          <a:fillRef idx="1">
+            <a:schemeClr val="accent5"/>
+          </a:fillRef>
+          <a:effectRef idx="0">
+            <a:schemeClr val="accent5"/>
+          </a:effectRef>
+          <a:fontRef idx="minor">
+            <a:schemeClr val="lt1"/>
+          </a:fontRef>
+        </p:style>
+        <p:txBody>
+          <a:bodyPr rtlCol="0" anchor="ctr"/>
+          <a:lstStyle/>
+          <a:p>
+            <a:pPr algn="ctr"/>
+            <a:endParaRPr lang="en-US"/>
+          </a:p>
+        </p:txBody>
+      </p:sp>
+      <p:sp>
+        <p:nvSpPr>
+          <p:cNvPr id="17" name="Left Arrow 16">
+            <a:extLst>
+              <a:ext uri="{FF2B5EF4-FFF2-40B4-BE49-F238E27FC236}">
+                <a16:creationId xmlns:a16="http://schemas.microsoft.com/office/drawing/2014/main" id="{779E847F-95AC-3145-B000-D4F92151AA3F}"/>
+              </a:ext>
+            </a:extLst>
+          </p:cNvPr>
+          <p:cNvSpPr/>
+          <p:nvPr/>
+        </p:nvSpPr>
+        <p:spPr>
+          <a:xfrm>
+            <a:off x="2444342" y="3670412"/>
+            <a:ext cx="4845132" cy="106878"/>
+          </a:xfrm>
+          <a:prstGeom prst="leftArrow">
+            <a:avLst/>
+          </a:prstGeom>
+        </p:spPr>
+        <p:style>
+          <a:lnRef idx="2">
+            <a:schemeClr val="accent5">
+              <a:shade val="50000"/>
+            </a:schemeClr>
+          </a:lnRef>
+          <a:fillRef idx="1">
+            <a:schemeClr val="accent5"/>
+          </a:fillRef>
+          <a:effectRef idx="0">
+            <a:schemeClr val="accent5"/>
+          </a:effectRef>
+          <a:fontRef idx="minor">
+            <a:schemeClr val="lt1"/>
+          </a:fontRef>
+        </p:style>
+        <p:txBody>
+          <a:bodyPr rtlCol="0" anchor="ctr"/>
+          <a:lstStyle/>
+          <a:p>
+            <a:pPr algn="ctr"/>
+            <a:endParaRPr lang="en-US"/>
+          </a:p>
+        </p:txBody>
+      </p:sp>
+      <p:sp>
+        <p:nvSpPr>
+          <p:cNvPr id="18" name="Right Arrow 17">
+            <a:extLst>
+              <a:ext uri="{FF2B5EF4-FFF2-40B4-BE49-F238E27FC236}">
+                <a16:creationId xmlns:a16="http://schemas.microsoft.com/office/drawing/2014/main" id="{7754E123-B502-2B48-A4A4-B4E923449974}"/>
+              </a:ext>
+            </a:extLst>
+          </p:cNvPr>
+          <p:cNvSpPr/>
+          <p:nvPr/>
+        </p:nvSpPr>
+        <p:spPr>
+          <a:xfrm>
+            <a:off x="2444342" y="2888865"/>
+            <a:ext cx="4845132" cy="118753"/>
+          </a:xfrm>
+          <a:prstGeom prst="rightArrow">
+            <a:avLst/>
+          </a:prstGeom>
+        </p:spPr>
+        <p:style>
+          <a:lnRef idx="2">
+            <a:schemeClr val="accent5">
+              <a:shade val="50000"/>
+            </a:schemeClr>
+          </a:lnRef>
+          <a:fillRef idx="1">
+            <a:schemeClr val="accent5"/>
+          </a:fillRef>
+          <a:effectRef idx="0">
+            <a:schemeClr val="accent5"/>
+          </a:effectRef>
+          <a:fontRef idx="minor">
+            <a:schemeClr val="lt1"/>
+          </a:fontRef>
+        </p:style>
+        <p:txBody>
+          <a:bodyPr rtlCol="0" anchor="ctr"/>
+          <a:lstStyle/>
+          <a:p>
+            <a:pPr algn="ctr"/>
+            <a:endParaRPr lang="en-US"/>
+          </a:p>
+        </p:txBody>
+      </p:sp>
+      <p:sp>
+        <p:nvSpPr>
+          <p:cNvPr id="19" name="Left Arrow 18">
+            <a:extLst>
+              <a:ext uri="{FF2B5EF4-FFF2-40B4-BE49-F238E27FC236}">
+                <a16:creationId xmlns:a16="http://schemas.microsoft.com/office/drawing/2014/main" id="{A38676AB-95FE-A04B-9ECA-49CBF999C536}"/>
+              </a:ext>
+            </a:extLst>
+          </p:cNvPr>
+          <p:cNvSpPr/>
+          <p:nvPr/>
+        </p:nvSpPr>
+        <p:spPr>
+          <a:xfrm>
+            <a:off x="2444342" y="5743579"/>
+            <a:ext cx="4845132" cy="106878"/>
+          </a:xfrm>
+          <a:prstGeom prst="leftArrow">
+            <a:avLst/>
+          </a:prstGeom>
+        </p:spPr>
+        <p:style>
+          <a:lnRef idx="2">
+            <a:schemeClr val="accent5">
+              <a:shade val="50000"/>
+            </a:schemeClr>
+          </a:lnRef>
+          <a:fillRef idx="1">
+            <a:schemeClr val="accent5"/>
+          </a:fillRef>
+          <a:effectRef idx="0">
+            <a:schemeClr val="accent5"/>
+          </a:effectRef>
+          <a:fontRef idx="minor">
+            <a:schemeClr val="lt1"/>
+          </a:fontRef>
+        </p:style>
+        <p:txBody>
+          <a:bodyPr rtlCol="0" anchor="ctr"/>
+          <a:lstStyle/>
+          <a:p>
+            <a:pPr algn="ctr"/>
+            <a:endParaRPr lang="en-US"/>
+          </a:p>
+        </p:txBody>
+      </p:sp>
+      <p:sp>
+        <p:nvSpPr>
+          <p:cNvPr id="20" name="Right Arrow 19">
+            <a:extLst>
+              <a:ext uri="{FF2B5EF4-FFF2-40B4-BE49-F238E27FC236}">
+                <a16:creationId xmlns:a16="http://schemas.microsoft.com/office/drawing/2014/main" id="{181C1CC6-8C3F-B844-8116-7DDA7624F0AC}"/>
+              </a:ext>
+            </a:extLst>
+          </p:cNvPr>
+          <p:cNvSpPr/>
+          <p:nvPr/>
+        </p:nvSpPr>
+        <p:spPr>
+          <a:xfrm>
+            <a:off x="2444342" y="4898956"/>
+            <a:ext cx="4845132" cy="118753"/>
+          </a:xfrm>
+          <a:prstGeom prst="rightArrow">
+            <a:avLst/>
+          </a:prstGeom>
+        </p:spPr>
+        <p:style>
+          <a:lnRef idx="2">
+            <a:schemeClr val="accent5">
+              <a:shade val="50000"/>
+            </a:schemeClr>
+          </a:lnRef>
+          <a:fillRef idx="1">
+            <a:schemeClr val="accent5"/>
+          </a:fillRef>
+          <a:effectRef idx="0">
+            <a:schemeClr val="accent5"/>
+          </a:effectRef>
+          <a:fontRef idx="minor">
+            <a:schemeClr val="lt1"/>
+          </a:fontRef>
+        </p:style>
+        <p:txBody>
+          <a:bodyPr rtlCol="0" anchor="ctr"/>
+          <a:lstStyle/>
+          <a:p>
+            <a:pPr algn="ctr"/>
+            <a:endParaRPr lang="en-US"/>
+          </a:p>
+        </p:txBody>
+      </p:sp>
+      <p:sp>
+        <p:nvSpPr>
+          <p:cNvPr id="14" name="TextBox 13">
+            <a:extLst>
+              <a:ext uri="{FF2B5EF4-FFF2-40B4-BE49-F238E27FC236}">
+                <a16:creationId xmlns:a16="http://schemas.microsoft.com/office/drawing/2014/main" id="{F53D3163-07E0-964B-8752-DD1A0919F517}"/>
+              </a:ext>
+            </a:extLst>
+          </p:cNvPr>
+          <p:cNvSpPr txBox="1"/>
+          <p:nvPr/>
+        </p:nvSpPr>
+        <p:spPr>
+          <a:xfrm>
+            <a:off x="2532045" y="112346"/>
+            <a:ext cx="4569399" cy="1200329"/>
+          </a:xfrm>
+          <a:prstGeom prst="rect">
+            <a:avLst/>
+          </a:prstGeom>
+          <a:noFill/>
+        </p:spPr>
+        <p:txBody>
+          <a:bodyPr wrap="square" rtlCol="0">
+            <a:spAutoFit/>
+          </a:bodyPr>
+          <a:lstStyle/>
+          <a:p>
+            <a:r>
+              <a:rPr lang="en-US" dirty="0"/>
+              <a:t>	Authorization Request,</a:t>
+            </a:r>
+          </a:p>
+          <a:p>
+            <a:r>
+              <a:rPr lang="en-US" dirty="0"/>
+              <a:t>client-id=album-maker</a:t>
+            </a:r>
+          </a:p>
+          <a:p>
+            <a:r>
+              <a:rPr lang="en-US" dirty="0" err="1"/>
+              <a:t>redirect_url</a:t>
+            </a:r>
+            <a:r>
+              <a:rPr lang="en-US" dirty="0"/>
+              <a:t>=http://album-</a:t>
+            </a:r>
+            <a:r>
+              <a:rPr lang="en-US" dirty="0" err="1"/>
+              <a:t>maker.com</a:t>
+            </a:r>
+            <a:r>
+              <a:rPr lang="en-US" dirty="0"/>
+              <a:t>/callback</a:t>
+            </a:r>
+          </a:p>
+          <a:p>
+            <a:r>
+              <a:rPr lang="en-US" dirty="0"/>
+              <a:t>scope=photos</a:t>
+            </a:r>
+          </a:p>
+        </p:txBody>
+      </p:sp>
+      <p:sp>
+        <p:nvSpPr>
+          <p:cNvPr id="22" name="TextBox 21">
+            <a:extLst>
+              <a:ext uri="{FF2B5EF4-FFF2-40B4-BE49-F238E27FC236}">
+                <a16:creationId xmlns:a16="http://schemas.microsoft.com/office/drawing/2014/main" id="{C18AE585-53A6-8F46-BDE9-8487F048DA99}"/>
+              </a:ext>
+            </a:extLst>
+          </p:cNvPr>
+          <p:cNvSpPr txBox="1"/>
+          <p:nvPr/>
+        </p:nvSpPr>
+        <p:spPr>
+          <a:xfrm>
+            <a:off x="3764477" y="1472862"/>
+            <a:ext cx="2897579" cy="646331"/>
+          </a:xfrm>
+          <a:prstGeom prst="rect">
+            <a:avLst/>
+          </a:prstGeom>
+          <a:noFill/>
+        </p:spPr>
+        <p:txBody>
+          <a:bodyPr wrap="square" rtlCol="0">
+            <a:spAutoFit/>
+          </a:bodyPr>
+          <a:lstStyle/>
+          <a:p>
+            <a:r>
+              <a:rPr lang="en-US" dirty="0"/>
+              <a:t>Authorization Grant,</a:t>
+            </a:r>
+          </a:p>
+          <a:p>
+            <a:r>
+              <a:rPr lang="en-US" dirty="0"/>
+              <a:t>code = a384 </a:t>
+            </a:r>
+          </a:p>
+        </p:txBody>
+      </p:sp>
+      <p:sp>
+        <p:nvSpPr>
+          <p:cNvPr id="23" name="TextBox 22">
+            <a:extLst>
+              <a:ext uri="{FF2B5EF4-FFF2-40B4-BE49-F238E27FC236}">
+                <a16:creationId xmlns:a16="http://schemas.microsoft.com/office/drawing/2014/main" id="{97B51417-E9C5-BF4B-931A-6808822CE87F}"/>
+              </a:ext>
+            </a:extLst>
+          </p:cNvPr>
+          <p:cNvSpPr txBox="1"/>
+          <p:nvPr/>
+        </p:nvSpPr>
+        <p:spPr>
+          <a:xfrm>
+            <a:off x="3431969" y="2348353"/>
+            <a:ext cx="3039095" cy="923330"/>
+          </a:xfrm>
+          <a:prstGeom prst="rect">
+            <a:avLst/>
+          </a:prstGeom>
+          <a:noFill/>
+        </p:spPr>
+        <p:txBody>
+          <a:bodyPr wrap="square" rtlCol="0">
+            <a:spAutoFit/>
+          </a:bodyPr>
+          <a:lstStyle/>
+          <a:p>
+            <a:r>
+              <a:rPr lang="en-US" dirty="0"/>
+              <a:t>Authorization Token Request,</a:t>
+            </a:r>
+          </a:p>
+          <a:p>
+            <a:r>
+              <a:rPr lang="en-US" dirty="0"/>
+              <a:t>code = a384, client-id=album-maker, password=secret </a:t>
+            </a:r>
+          </a:p>
+        </p:txBody>
+      </p:sp>
+      <p:sp>
+        <p:nvSpPr>
+          <p:cNvPr id="24" name="TextBox 23">
+            <a:extLst>
+              <a:ext uri="{FF2B5EF4-FFF2-40B4-BE49-F238E27FC236}">
+                <a16:creationId xmlns:a16="http://schemas.microsoft.com/office/drawing/2014/main" id="{ED49C46C-8602-9D4F-AA28-6B4B1D44BDD9}"/>
+              </a:ext>
+            </a:extLst>
+          </p:cNvPr>
+          <p:cNvSpPr txBox="1"/>
+          <p:nvPr/>
+        </p:nvSpPr>
+        <p:spPr>
+          <a:xfrm>
+            <a:off x="3433944" y="3400685"/>
+            <a:ext cx="3228112" cy="646331"/>
+          </a:xfrm>
+          <a:prstGeom prst="rect">
+            <a:avLst/>
+          </a:prstGeom>
+          <a:noFill/>
+        </p:spPr>
+        <p:txBody>
+          <a:bodyPr wrap="square" rtlCol="0">
+            <a:spAutoFit/>
+          </a:bodyPr>
+          <a:lstStyle/>
+          <a:p>
+            <a:r>
+              <a:rPr lang="en-US" dirty="0"/>
+              <a:t>Authorization Token Response,</a:t>
+            </a:r>
+          </a:p>
+          <a:p>
+            <a:r>
+              <a:rPr lang="en-US" dirty="0" err="1"/>
+              <a:t>auth_token</a:t>
+            </a:r>
+            <a:r>
+              <a:rPr lang="en-US" dirty="0"/>
+              <a:t> = aae3341</a:t>
+            </a:r>
+          </a:p>
+        </p:txBody>
+      </p:sp>
+      <p:sp>
+        <p:nvSpPr>
+          <p:cNvPr id="25" name="TextBox 24">
+            <a:extLst>
+              <a:ext uri="{FF2B5EF4-FFF2-40B4-BE49-F238E27FC236}">
+                <a16:creationId xmlns:a16="http://schemas.microsoft.com/office/drawing/2014/main" id="{58441C38-44FF-184F-80D3-88A49D1055A4}"/>
+              </a:ext>
+            </a:extLst>
+          </p:cNvPr>
+          <p:cNvSpPr txBox="1"/>
+          <p:nvPr/>
+        </p:nvSpPr>
+        <p:spPr>
+          <a:xfrm>
+            <a:off x="3486397" y="4623568"/>
+            <a:ext cx="3228112" cy="646331"/>
+          </a:xfrm>
+          <a:prstGeom prst="rect">
+            <a:avLst/>
+          </a:prstGeom>
+          <a:noFill/>
+        </p:spPr>
+        <p:txBody>
+          <a:bodyPr wrap="square" rtlCol="0">
+            <a:spAutoFit/>
+          </a:bodyPr>
+          <a:lstStyle/>
+          <a:p>
+            <a:r>
+              <a:rPr lang="en-US" dirty="0"/>
+              <a:t>Protected Resource Request,</a:t>
+            </a:r>
+          </a:p>
+          <a:p>
+            <a:r>
+              <a:rPr lang="en-US" dirty="0" err="1"/>
+              <a:t>auth_token</a:t>
+            </a:r>
+            <a:r>
+              <a:rPr lang="en-US" dirty="0"/>
+              <a:t> = aae3341</a:t>
+            </a:r>
+          </a:p>
+        </p:txBody>
+      </p:sp>
+      <p:sp>
+        <p:nvSpPr>
+          <p:cNvPr id="26" name="TextBox 25">
+            <a:extLst>
+              <a:ext uri="{FF2B5EF4-FFF2-40B4-BE49-F238E27FC236}">
+                <a16:creationId xmlns:a16="http://schemas.microsoft.com/office/drawing/2014/main" id="{24A1D37F-20CC-9142-AC86-6CB7ABDFD1EB}"/>
+              </a:ext>
+            </a:extLst>
+          </p:cNvPr>
+          <p:cNvSpPr txBox="1"/>
+          <p:nvPr/>
+        </p:nvSpPr>
+        <p:spPr>
+          <a:xfrm>
+            <a:off x="3431969" y="5807899"/>
+            <a:ext cx="3228112" cy="646331"/>
+          </a:xfrm>
+          <a:prstGeom prst="rect">
+            <a:avLst/>
+          </a:prstGeom>
+          <a:noFill/>
+        </p:spPr>
+        <p:txBody>
+          <a:bodyPr wrap="square" rtlCol="0">
+            <a:spAutoFit/>
+          </a:bodyPr>
+          <a:lstStyle/>
+          <a:p>
+            <a:r>
+              <a:rPr lang="en-US" dirty="0"/>
+              <a:t>Protected Resource Response,</a:t>
+            </a:r>
+          </a:p>
+          <a:p>
+            <a:r>
+              <a:rPr lang="en-US" dirty="0"/>
+              <a:t>{</a:t>
+            </a:r>
+            <a:r>
+              <a:rPr lang="en-US" dirty="0" err="1"/>
+              <a:t>selfie.jpg</a:t>
+            </a:r>
+            <a:r>
+              <a:rPr lang="en-US" dirty="0"/>
+              <a:t>, </a:t>
+            </a:r>
+            <a:r>
+              <a:rPr lang="en-US" dirty="0" err="1"/>
+              <a:t>duckface.jpg</a:t>
+            </a:r>
+            <a:r>
+              <a:rPr lang="en-US" dirty="0"/>
+              <a:t>…..}</a:t>
+            </a:r>
+          </a:p>
+        </p:txBody>
+      </p:sp>
+    </p:spTree>
+    <p:extLst>
+      <p:ext uri="{BB962C8B-B14F-4D97-AF65-F5344CB8AC3E}">
+        <p14:creationId xmlns:p14="http://schemas.microsoft.com/office/powerpoint/2010/main" val="2391947299"/>
       </p:ext>
     </p:extLst>
   </p:cSld>

</xml_diff>